<commit_message>
updated README fig again
</commit_message>
<xml_diff>
--- a/overview/figs/module_mapping.pptx
+++ b/overview/figs/module_mapping.pptx
@@ -212,7 +212,7 @@
           <a:p>
             <a:fld id="{BB480425-F5BB-3C48-9C49-E25BDA418761}" type="datetimeFigureOut">
               <a:rPr lang="en-US" smtClean="0"/>
-              <a:t>8/6/20</a:t>
+              <a:t>5/31/22</a:t>
             </a:fld>
             <a:endParaRPr lang="en-US"/>
           </a:p>
@@ -658,7 +658,7 @@
           <a:p>
             <a:fld id="{C675BEDA-EA79-CC4B-8964-092F4F6F161A}" type="datetimeFigureOut">
               <a:rPr lang="en-US" smtClean="0"/>
-              <a:t>8/6/20</a:t>
+              <a:t>5/31/22</a:t>
             </a:fld>
             <a:endParaRPr lang="en-US"/>
           </a:p>
@@ -826,7 +826,7 @@
           <a:p>
             <a:fld id="{C675BEDA-EA79-CC4B-8964-092F4F6F161A}" type="datetimeFigureOut">
               <a:rPr lang="en-US" smtClean="0"/>
-              <a:t>8/6/20</a:t>
+              <a:t>5/31/22</a:t>
             </a:fld>
             <a:endParaRPr lang="en-US"/>
           </a:p>
@@ -1004,7 +1004,7 @@
           <a:p>
             <a:fld id="{C675BEDA-EA79-CC4B-8964-092F4F6F161A}" type="datetimeFigureOut">
               <a:rPr lang="en-US" smtClean="0"/>
-              <a:t>8/6/20</a:t>
+              <a:t>5/31/22</a:t>
             </a:fld>
             <a:endParaRPr lang="en-US"/>
           </a:p>
@@ -1172,7 +1172,7 @@
           <a:p>
             <a:fld id="{C675BEDA-EA79-CC4B-8964-092F4F6F161A}" type="datetimeFigureOut">
               <a:rPr lang="en-US" smtClean="0"/>
-              <a:t>8/6/20</a:t>
+              <a:t>5/31/22</a:t>
             </a:fld>
             <a:endParaRPr lang="en-US"/>
           </a:p>
@@ -1417,7 +1417,7 @@
           <a:p>
             <a:fld id="{C675BEDA-EA79-CC4B-8964-092F4F6F161A}" type="datetimeFigureOut">
               <a:rPr lang="en-US" smtClean="0"/>
-              <a:t>8/6/20</a:t>
+              <a:t>5/31/22</a:t>
             </a:fld>
             <a:endParaRPr lang="en-US"/>
           </a:p>
@@ -1702,7 +1702,7 @@
           <a:p>
             <a:fld id="{C675BEDA-EA79-CC4B-8964-092F4F6F161A}" type="datetimeFigureOut">
               <a:rPr lang="en-US" smtClean="0"/>
-              <a:t>8/6/20</a:t>
+              <a:t>5/31/22</a:t>
             </a:fld>
             <a:endParaRPr lang="en-US"/>
           </a:p>
@@ -2121,7 +2121,7 @@
           <a:p>
             <a:fld id="{C675BEDA-EA79-CC4B-8964-092F4F6F161A}" type="datetimeFigureOut">
               <a:rPr lang="en-US" smtClean="0"/>
-              <a:t>8/6/20</a:t>
+              <a:t>5/31/22</a:t>
             </a:fld>
             <a:endParaRPr lang="en-US"/>
           </a:p>
@@ -2238,7 +2238,7 @@
           <a:p>
             <a:fld id="{C675BEDA-EA79-CC4B-8964-092F4F6F161A}" type="datetimeFigureOut">
               <a:rPr lang="en-US" smtClean="0"/>
-              <a:t>8/6/20</a:t>
+              <a:t>5/31/22</a:t>
             </a:fld>
             <a:endParaRPr lang="en-US"/>
           </a:p>
@@ -2333,7 +2333,7 @@
           <a:p>
             <a:fld id="{C675BEDA-EA79-CC4B-8964-092F4F6F161A}" type="datetimeFigureOut">
               <a:rPr lang="en-US" smtClean="0"/>
-              <a:t>8/6/20</a:t>
+              <a:t>5/31/22</a:t>
             </a:fld>
             <a:endParaRPr lang="en-US"/>
           </a:p>
@@ -2608,7 +2608,7 @@
           <a:p>
             <a:fld id="{C675BEDA-EA79-CC4B-8964-092F4F6F161A}" type="datetimeFigureOut">
               <a:rPr lang="en-US" smtClean="0"/>
-              <a:t>8/6/20</a:t>
+              <a:t>5/31/22</a:t>
             </a:fld>
             <a:endParaRPr lang="en-US"/>
           </a:p>
@@ -2860,7 +2860,7 @@
           <a:p>
             <a:fld id="{C675BEDA-EA79-CC4B-8964-092F4F6F161A}" type="datetimeFigureOut">
               <a:rPr lang="en-US" smtClean="0"/>
-              <a:t>8/6/20</a:t>
+              <a:t>5/31/22</a:t>
             </a:fld>
             <a:endParaRPr lang="en-US"/>
           </a:p>
@@ -3071,7 +3071,7 @@
           <a:p>
             <a:fld id="{C675BEDA-EA79-CC4B-8964-092F4F6F161A}" type="datetimeFigureOut">
               <a:rPr lang="en-US" smtClean="0"/>
-              <a:t>8/6/20</a:t>
+              <a:t>5/31/22</a:t>
             </a:fld>
             <a:endParaRPr lang="en-US"/>
           </a:p>
@@ -6672,1254 +6672,1333 @@
       </p:grpSpPr>
       <p:grpSp>
         <p:nvGrpSpPr>
-          <p:cNvPr id="131" name="Group 130"/>
+          <p:cNvPr id="8" name="Group 7">
+            <a:extLst>
+              <a:ext uri="{FF2B5EF4-FFF2-40B4-BE49-F238E27FC236}">
+                <a16:creationId xmlns:a16="http://schemas.microsoft.com/office/drawing/2014/main" id="{26A1D959-C5F6-7B31-8484-84E731F04823}"/>
+              </a:ext>
+            </a:extLst>
+          </p:cNvPr>
           <p:cNvGrpSpPr/>
           <p:nvPr/>
         </p:nvGrpSpPr>
         <p:grpSpPr>
           <a:xfrm>
-            <a:off x="464335" y="720802"/>
-            <a:ext cx="8254442" cy="2336529"/>
-            <a:chOff x="517466" y="265722"/>
-            <a:chExt cx="7716209" cy="2683146"/>
+            <a:off x="446242" y="903405"/>
+            <a:ext cx="8395898" cy="2764705"/>
+            <a:chOff x="446242" y="903405"/>
+            <a:chExt cx="8395898" cy="2764705"/>
           </a:xfrm>
         </p:grpSpPr>
+        <p:sp>
+          <p:nvSpPr>
+            <p:cNvPr id="2" name="Rectangle 1">
+              <a:extLst>
+                <a:ext uri="{FF2B5EF4-FFF2-40B4-BE49-F238E27FC236}">
+                  <a16:creationId xmlns:a16="http://schemas.microsoft.com/office/drawing/2014/main" id="{F06469FA-7526-0476-CEFE-E3A9B5FDF7FA}"/>
+                </a:ext>
+              </a:extLst>
+            </p:cNvPr>
+            <p:cNvSpPr/>
+            <p:nvPr/>
+          </p:nvSpPr>
+          <p:spPr>
+            <a:xfrm>
+              <a:off x="446242" y="903405"/>
+              <a:ext cx="8395898" cy="2764705"/>
+            </a:xfrm>
+            <a:prstGeom prst="rect">
+              <a:avLst/>
+            </a:prstGeom>
+            <a:solidFill>
+              <a:schemeClr val="bg1"/>
+            </a:solidFill>
+            <a:ln>
+              <a:solidFill>
+                <a:schemeClr val="tx1"/>
+              </a:solidFill>
+            </a:ln>
+          </p:spPr>
+          <p:style>
+            <a:lnRef idx="1">
+              <a:schemeClr val="accent1"/>
+            </a:lnRef>
+            <a:fillRef idx="3">
+              <a:schemeClr val="accent1"/>
+            </a:fillRef>
+            <a:effectRef idx="2">
+              <a:schemeClr val="accent1"/>
+            </a:effectRef>
+            <a:fontRef idx="minor">
+              <a:schemeClr val="lt1"/>
+            </a:fontRef>
+          </p:style>
+          <p:txBody>
+            <a:bodyPr rtlCol="0" anchor="ctr"/>
+            <a:lstStyle/>
+            <a:p>
+              <a:pPr algn="ctr"/>
+              <a:endParaRPr lang="en-US"/>
+            </a:p>
+          </p:txBody>
+        </p:sp>
         <p:grpSp>
           <p:nvGrpSpPr>
-            <p:cNvPr id="3" name="Group 12"/>
+            <p:cNvPr id="4" name="Group 3">
+              <a:extLst>
+                <a:ext uri="{FF2B5EF4-FFF2-40B4-BE49-F238E27FC236}">
+                  <a16:creationId xmlns:a16="http://schemas.microsoft.com/office/drawing/2014/main" id="{2C40815D-B2FF-F674-A306-30CBEA0FBF98}"/>
+                </a:ext>
+              </a:extLst>
+            </p:cNvPr>
             <p:cNvGrpSpPr/>
             <p:nvPr/>
           </p:nvGrpSpPr>
           <p:grpSpPr>
             <a:xfrm>
-              <a:off x="1296194" y="990600"/>
-              <a:ext cx="1751806" cy="1186647"/>
-              <a:chOff x="1447800" y="674225"/>
-              <a:chExt cx="1828800" cy="683451"/>
+              <a:off x="472966" y="1067643"/>
+              <a:ext cx="8224792" cy="2336529"/>
+              <a:chOff x="472966" y="1067643"/>
+              <a:chExt cx="8224792" cy="2336529"/>
             </a:xfrm>
-            <a:effectLst/>
           </p:grpSpPr>
-          <p:sp>
-            <p:nvSpPr>
-              <p:cNvPr id="14" name="Rounded Rectangle 13"/>
-              <p:cNvSpPr/>
+          <p:grpSp>
+            <p:nvGrpSpPr>
+              <p:cNvPr id="3" name="Group 12"/>
+              <p:cNvGrpSpPr/>
               <p:nvPr/>
-            </p:nvSpPr>
-            <p:spPr>
+            </p:nvGrpSpPr>
+            <p:grpSpPr>
               <a:xfrm>
-                <a:off x="1447800" y="674225"/>
-                <a:ext cx="1828800" cy="683451"/>
+                <a:off x="1303021" y="1698879"/>
+                <a:ext cx="1867269" cy="1033352"/>
+                <a:chOff x="1447800" y="674225"/>
+                <a:chExt cx="1828800" cy="683451"/>
               </a:xfrm>
-              <a:prstGeom prst="roundRect">
-                <a:avLst/>
-              </a:prstGeom>
-              <a:noFill/>
-              <a:ln w="12700" cap="sq" cmpd="sng" algn="ctr">
-                <a:solidFill>
-                  <a:schemeClr val="tx1"/>
-                </a:solidFill>
-                <a:round/>
-                <a:headEnd type="none" w="med" len="med"/>
-                <a:tailEnd w="med" len="med"/>
-              </a:ln>
               <a:effectLst/>
-            </p:spPr>
-            <p:style>
-              <a:lnRef idx="1">
-                <a:schemeClr val="accent1"/>
-              </a:lnRef>
-              <a:fillRef idx="3">
-                <a:schemeClr val="accent1"/>
-              </a:fillRef>
-              <a:effectRef idx="2">
-                <a:schemeClr val="accent1"/>
-              </a:effectRef>
-              <a:fontRef idx="minor">
-                <a:schemeClr val="lt1"/>
-              </a:fontRef>
-            </p:style>
-            <p:txBody>
-              <a:bodyPr rtlCol="0" anchor="t"/>
-              <a:lstStyle/>
-              <a:p>
-                <a:pPr algn="ctr"/>
-                <a:endParaRPr lang="en-US" sz="1000" dirty="0">
+            </p:grpSpPr>
+            <p:sp>
+              <p:nvSpPr>
+                <p:cNvPr id="14" name="Rounded Rectangle 13"/>
+                <p:cNvSpPr/>
+                <p:nvPr/>
+              </p:nvSpPr>
+              <p:spPr>
+                <a:xfrm>
+                  <a:off x="1447800" y="674225"/>
+                  <a:ext cx="1828800" cy="683451"/>
+                </a:xfrm>
+                <a:prstGeom prst="roundRect">
+                  <a:avLst/>
+                </a:prstGeom>
+                <a:noFill/>
+                <a:ln w="12700" cap="sq" cmpd="sng" algn="ctr">
                   <a:solidFill>
                     <a:schemeClr val="tx1"/>
                   </a:solidFill>
-                  <a:latin typeface="Calibri Light" charset="0"/>
-                  <a:ea typeface="Calibri Light" charset="0"/>
-                  <a:cs typeface="Calibri Light" charset="0"/>
-                </a:endParaRPr>
-              </a:p>
-              <a:p>
-                <a:pPr algn="ctr"/>
-                <a:endParaRPr lang="en-US" sz="1000" dirty="0">
-                  <a:solidFill>
-                    <a:schemeClr val="tx1"/>
-                  </a:solidFill>
-                  <a:latin typeface="Calibri Light" charset="0"/>
-                  <a:ea typeface="Calibri Light" charset="0"/>
-                  <a:cs typeface="Calibri Light" charset="0"/>
-                </a:endParaRPr>
-              </a:p>
-              <a:p>
-                <a:pPr algn="ctr"/>
-                <a:endParaRPr lang="en-US" sz="1000" dirty="0">
-                  <a:solidFill>
-                    <a:schemeClr val="tx1"/>
-                  </a:solidFill>
-                  <a:latin typeface="Calibri Light" charset="0"/>
-                  <a:ea typeface="Calibri Light" charset="0"/>
-                  <a:cs typeface="Calibri Light" charset="0"/>
-                </a:endParaRPr>
-              </a:p>
-              <a:p>
-                <a:pPr algn="ctr"/>
-                <a:r>
-                  <a:rPr lang="en-US" sz="1000" dirty="0">
+                  <a:round/>
+                  <a:headEnd type="none" w="med" len="med"/>
+                  <a:tailEnd w="med" len="med"/>
+                </a:ln>
+                <a:effectLst/>
+              </p:spPr>
+              <p:style>
+                <a:lnRef idx="1">
+                  <a:schemeClr val="accent1"/>
+                </a:lnRef>
+                <a:fillRef idx="3">
+                  <a:schemeClr val="accent1"/>
+                </a:fillRef>
+                <a:effectRef idx="2">
+                  <a:schemeClr val="accent1"/>
+                </a:effectRef>
+                <a:fontRef idx="minor">
+                  <a:schemeClr val="lt1"/>
+                </a:fontRef>
+              </p:style>
+              <p:txBody>
+                <a:bodyPr rtlCol="0" anchor="t"/>
+                <a:lstStyle/>
+                <a:p>
+                  <a:pPr algn="ctr"/>
+                  <a:endParaRPr lang="en-US" sz="1000" dirty="0">
                     <a:solidFill>
                       <a:schemeClr val="tx1"/>
                     </a:solidFill>
                     <a:latin typeface="Calibri Light" charset="0"/>
                     <a:ea typeface="Calibri Light" charset="0"/>
                     <a:cs typeface="Calibri Light" charset="0"/>
-                  </a:rPr>
-                  <a:t>Hybrid Algorithms</a:t>
-                </a:r>
-              </a:p>
-              <a:p>
-                <a:pPr algn="ctr"/>
-                <a:r>
-                  <a:rPr lang="en-US" sz="1000" dirty="0">
+                  </a:endParaRPr>
+                </a:p>
+                <a:p>
+                  <a:pPr algn="ctr"/>
+                  <a:endParaRPr lang="en-US" sz="1000" dirty="0">
                     <a:solidFill>
                       <a:schemeClr val="tx1"/>
                     </a:solidFill>
                     <a:latin typeface="Calibri Light" charset="0"/>
                     <a:ea typeface="Calibri Light" charset="0"/>
                     <a:cs typeface="Calibri Light" charset="0"/>
-                  </a:rPr>
-                  <a:t>Hybrid Design Patterns</a:t>
-                </a:r>
-              </a:p>
-              <a:p>
-                <a:pPr algn="ctr"/>
-                <a:r>
-                  <a:rPr lang="en-US" sz="1000" dirty="0">
+                  </a:endParaRPr>
+                </a:p>
+                <a:p>
+                  <a:pPr algn="ctr"/>
+                  <a:endParaRPr lang="en-US" sz="1000" dirty="0">
                     <a:solidFill>
                       <a:schemeClr val="tx1"/>
                     </a:solidFill>
                     <a:latin typeface="Calibri Light" charset="0"/>
                     <a:ea typeface="Calibri Light" charset="0"/>
                     <a:cs typeface="Calibri Light" charset="0"/>
-                  </a:rPr>
-                  <a:t>GPU Algorithms</a:t>
-                </a:r>
-              </a:p>
-              <a:p>
-                <a:pPr algn="ctr"/>
-                <a:endParaRPr lang="en-US" sz="1000" dirty="0">
-                  <a:solidFill>
-                    <a:schemeClr val="tx1"/>
-                  </a:solidFill>
-                  <a:latin typeface="Calibri Light" charset="0"/>
-                  <a:ea typeface="Calibri Light" charset="0"/>
-                  <a:cs typeface="Calibri Light" charset="0"/>
-                </a:endParaRPr>
-              </a:p>
-            </p:txBody>
-          </p:sp>
-          <p:sp>
-            <p:nvSpPr>
-              <p:cNvPr id="15" name="Round Same Side Corner Rectangle 14"/>
-              <p:cNvSpPr/>
-              <p:nvPr/>
-            </p:nvSpPr>
-            <p:spPr>
-              <a:xfrm>
-                <a:off x="1447800" y="674225"/>
-                <a:ext cx="1828800" cy="302389"/>
-              </a:xfrm>
-              <a:prstGeom prst="round2SameRect">
-                <a:avLst/>
-              </a:prstGeom>
-              <a:solidFill>
-                <a:srgbClr val="CCFFCC"/>
-              </a:solidFill>
-              <a:ln w="12700" cmpd="sng" algn="ctr">
-                <a:solidFill>
-                  <a:schemeClr val="tx1"/>
-                </a:solidFill>
-                <a:round/>
-                <a:headEnd type="none" w="med" len="med"/>
-                <a:tailEnd w="med" len="med"/>
-              </a:ln>
-              <a:effectLst/>
-            </p:spPr>
-            <p:style>
-              <a:lnRef idx="1">
-                <a:schemeClr val="accent1"/>
-              </a:lnRef>
-              <a:fillRef idx="3">
-                <a:schemeClr val="accent1"/>
-              </a:fillRef>
-              <a:effectRef idx="2">
-                <a:schemeClr val="accent1"/>
-              </a:effectRef>
-              <a:fontRef idx="minor">
-                <a:schemeClr val="lt1"/>
-              </a:fontRef>
-            </p:style>
-            <p:txBody>
-              <a:bodyPr rtlCol="0" anchor="ctr"/>
-              <a:lstStyle/>
-              <a:p>
-                <a:pPr algn="ctr"/>
-                <a:r>
-                  <a:rPr lang="en-US" sz="1100" b="1" dirty="0">
+                  </a:endParaRPr>
+                </a:p>
+                <a:p>
+                  <a:pPr algn="ctr"/>
+                  <a:r>
+                    <a:rPr lang="en-US" sz="1000" dirty="0">
+                      <a:solidFill>
+                        <a:schemeClr val="tx1"/>
+                      </a:solidFill>
+                      <a:latin typeface="Calibri Light" charset="0"/>
+                      <a:ea typeface="Calibri Light" charset="0"/>
+                      <a:cs typeface="Calibri Light" charset="0"/>
+                    </a:rPr>
+                    <a:t>Hybrid Algorithms</a:t>
+                  </a:r>
+                </a:p>
+                <a:p>
+                  <a:pPr algn="ctr"/>
+                  <a:r>
+                    <a:rPr lang="en-US" sz="1000" dirty="0">
+                      <a:solidFill>
+                        <a:schemeClr val="tx1"/>
+                      </a:solidFill>
+                      <a:latin typeface="Calibri Light" charset="0"/>
+                      <a:ea typeface="Calibri Light" charset="0"/>
+                      <a:cs typeface="Calibri Light" charset="0"/>
+                    </a:rPr>
+                    <a:t>Hybrid Design Patterns</a:t>
+                  </a:r>
+                </a:p>
+                <a:p>
+                  <a:pPr algn="ctr"/>
+                  <a:r>
+                    <a:rPr lang="en-US" sz="1000" dirty="0">
+                      <a:solidFill>
+                        <a:schemeClr val="tx1"/>
+                      </a:solidFill>
+                      <a:latin typeface="Calibri Light" charset="0"/>
+                      <a:ea typeface="Calibri Light" charset="0"/>
+                      <a:cs typeface="Calibri Light" charset="0"/>
+                    </a:rPr>
+                    <a:t>GPU Algorithms</a:t>
+                  </a:r>
+                </a:p>
+                <a:p>
+                  <a:pPr algn="ctr"/>
+                  <a:endParaRPr lang="en-US" sz="1000" dirty="0">
                     <a:solidFill>
                       <a:schemeClr val="tx1"/>
                     </a:solidFill>
                     <a:latin typeface="Calibri Light" charset="0"/>
                     <a:ea typeface="Calibri Light" charset="0"/>
                     <a:cs typeface="Calibri Light" charset="0"/>
-                  </a:rPr>
-                  <a:t>B. Algorithms</a:t>
-                </a:r>
-              </a:p>
-            </p:txBody>
-          </p:sp>
-        </p:grpSp>
-        <p:grpSp>
-          <p:nvGrpSpPr>
-            <p:cNvPr id="5" name="Group 15"/>
-            <p:cNvGrpSpPr/>
-            <p:nvPr/>
-          </p:nvGrpSpPr>
-          <p:grpSpPr>
-            <a:xfrm>
-              <a:off x="4713213" y="1219199"/>
-              <a:ext cx="2144788" cy="1320801"/>
-              <a:chOff x="1131813" y="476249"/>
-              <a:chExt cx="2144788" cy="990601"/>
-            </a:xfrm>
-            <a:effectLst/>
-          </p:grpSpPr>
-          <p:sp>
-            <p:nvSpPr>
-              <p:cNvPr id="17" name="Rounded Rectangle 16"/>
-              <p:cNvSpPr/>
-              <p:nvPr/>
-            </p:nvSpPr>
-            <p:spPr>
-              <a:xfrm>
-                <a:off x="1131813" y="476250"/>
-                <a:ext cx="2144788" cy="990600"/>
-              </a:xfrm>
-              <a:prstGeom prst="roundRect">
-                <a:avLst/>
-              </a:prstGeom>
-              <a:noFill/>
-              <a:ln w="12700" cap="sq" cmpd="sng" algn="ctr">
+                  </a:endParaRPr>
+                </a:p>
+              </p:txBody>
+            </p:sp>
+            <p:sp>
+              <p:nvSpPr>
+                <p:cNvPr id="15" name="Round Same Side Corner Rectangle 14"/>
+                <p:cNvSpPr/>
+                <p:nvPr/>
+              </p:nvSpPr>
+              <p:spPr>
+                <a:xfrm>
+                  <a:off x="1447800" y="674225"/>
+                  <a:ext cx="1828800" cy="302389"/>
+                </a:xfrm>
+                <a:prstGeom prst="round2SameRect">
+                  <a:avLst/>
+                </a:prstGeom>
                 <a:solidFill>
-                  <a:schemeClr val="tx1"/>
+                  <a:srgbClr val="CCFFCC"/>
                 </a:solidFill>
-                <a:round/>
-                <a:headEnd type="none" w="med" len="med"/>
-                <a:tailEnd w="med" len="med"/>
-              </a:ln>
-              <a:effectLst/>
-            </p:spPr>
-            <p:style>
-              <a:lnRef idx="1">
-                <a:schemeClr val="accent1"/>
-              </a:lnRef>
-              <a:fillRef idx="3">
-                <a:schemeClr val="accent1"/>
-              </a:fillRef>
-              <a:effectRef idx="2">
-                <a:schemeClr val="accent1"/>
-              </a:effectRef>
-              <a:fontRef idx="minor">
-                <a:schemeClr val="lt1"/>
-              </a:fontRef>
-            </p:style>
-            <p:txBody>
-              <a:bodyPr rtlCol="0" anchor="ctr"/>
-              <a:lstStyle/>
-              <a:p>
-                <a:pPr algn="ctr"/>
-                <a:endParaRPr lang="en-US" sz="1000" dirty="0">
+                <a:ln w="12700" cmpd="sng" algn="ctr">
                   <a:solidFill>
                     <a:schemeClr val="tx1"/>
                   </a:solidFill>
-                  <a:latin typeface="Calibri Light" charset="0"/>
-                  <a:ea typeface="Calibri Light" charset="0"/>
-                  <a:cs typeface="Calibri Light" charset="0"/>
-                </a:endParaRPr>
-              </a:p>
-              <a:p>
-                <a:pPr algn="ctr"/>
-                <a:endParaRPr lang="en-US" sz="1000" dirty="0">
+                  <a:round/>
+                  <a:headEnd type="none" w="med" len="med"/>
+                  <a:tailEnd w="med" len="med"/>
+                </a:ln>
+                <a:effectLst/>
+              </p:spPr>
+              <p:style>
+                <a:lnRef idx="1">
+                  <a:schemeClr val="accent1"/>
+                </a:lnRef>
+                <a:fillRef idx="3">
+                  <a:schemeClr val="accent1"/>
+                </a:fillRef>
+                <a:effectRef idx="2">
+                  <a:schemeClr val="accent1"/>
+                </a:effectRef>
+                <a:fontRef idx="minor">
+                  <a:schemeClr val="lt1"/>
+                </a:fontRef>
+              </p:style>
+              <p:txBody>
+                <a:bodyPr rtlCol="0" anchor="ctr"/>
+                <a:lstStyle/>
+                <a:p>
+                  <a:pPr algn="ctr"/>
+                  <a:r>
+                    <a:rPr lang="en-US" sz="1100" b="1" dirty="0">
+                      <a:solidFill>
+                        <a:schemeClr val="tx1"/>
+                      </a:solidFill>
+                      <a:latin typeface="Calibri Light" charset="0"/>
+                      <a:ea typeface="Calibri Light" charset="0"/>
+                      <a:cs typeface="Calibri Light" charset="0"/>
+                    </a:rPr>
+                    <a:t>B. Algorithms</a:t>
+                  </a:r>
+                </a:p>
+              </p:txBody>
+            </p:sp>
+          </p:grpSp>
+          <p:grpSp>
+            <p:nvGrpSpPr>
+              <p:cNvPr id="5" name="Group 15"/>
+              <p:cNvGrpSpPr/>
+              <p:nvPr/>
+            </p:nvGrpSpPr>
+            <p:grpSpPr>
+              <a:xfrm>
+                <a:off x="4945259" y="1897947"/>
+                <a:ext cx="2286153" cy="1150176"/>
+                <a:chOff x="1131813" y="476249"/>
+                <a:chExt cx="2144788" cy="990601"/>
+              </a:xfrm>
+              <a:effectLst/>
+            </p:grpSpPr>
+            <p:sp>
+              <p:nvSpPr>
+                <p:cNvPr id="17" name="Rounded Rectangle 16"/>
+                <p:cNvSpPr/>
+                <p:nvPr/>
+              </p:nvSpPr>
+              <p:spPr>
+                <a:xfrm>
+                  <a:off x="1131813" y="476250"/>
+                  <a:ext cx="2144788" cy="990600"/>
+                </a:xfrm>
+                <a:prstGeom prst="roundRect">
+                  <a:avLst/>
+                </a:prstGeom>
+                <a:noFill/>
+                <a:ln w="12700" cap="sq" cmpd="sng" algn="ctr">
                   <a:solidFill>
                     <a:schemeClr val="tx1"/>
                   </a:solidFill>
-                  <a:latin typeface="Calibri Light" charset="0"/>
-                  <a:ea typeface="Calibri Light" charset="0"/>
-                  <a:cs typeface="Calibri Light" charset="0"/>
-                </a:endParaRPr>
-              </a:p>
-              <a:p>
-                <a:pPr algn="ctr"/>
-                <a:endParaRPr lang="en-US" sz="1000" dirty="0">
-                  <a:solidFill>
-                    <a:schemeClr val="tx1"/>
-                  </a:solidFill>
-                  <a:latin typeface="Calibri Light" charset="0"/>
-                  <a:ea typeface="Calibri Light" charset="0"/>
-                  <a:cs typeface="Calibri Light" charset="0"/>
-                </a:endParaRPr>
-              </a:p>
-              <a:p>
-                <a:pPr algn="ctr"/>
-                <a:r>
-                  <a:rPr lang="en-US" sz="1000" dirty="0">
+                  <a:round/>
+                  <a:headEnd type="none" w="med" len="med"/>
+                  <a:tailEnd w="med" len="med"/>
+                </a:ln>
+                <a:effectLst/>
+              </p:spPr>
+              <p:style>
+                <a:lnRef idx="1">
+                  <a:schemeClr val="accent1"/>
+                </a:lnRef>
+                <a:fillRef idx="3">
+                  <a:schemeClr val="accent1"/>
+                </a:fillRef>
+                <a:effectRef idx="2">
+                  <a:schemeClr val="accent1"/>
+                </a:effectRef>
+                <a:fontRef idx="minor">
+                  <a:schemeClr val="lt1"/>
+                </a:fontRef>
+              </p:style>
+              <p:txBody>
+                <a:bodyPr rtlCol="0" anchor="ctr"/>
+                <a:lstStyle/>
+                <a:p>
+                  <a:pPr algn="ctr"/>
+                  <a:endParaRPr lang="en-US" sz="1000" dirty="0">
                     <a:solidFill>
                       <a:schemeClr val="tx1"/>
                     </a:solidFill>
                     <a:latin typeface="Calibri Light" charset="0"/>
                     <a:ea typeface="Calibri Light" charset="0"/>
                     <a:cs typeface="Calibri Light" charset="0"/>
-                  </a:rPr>
-                  <a:t>GPU Task Off-loading</a:t>
-                </a:r>
-              </a:p>
-              <a:p>
-                <a:pPr algn="ctr"/>
-                <a:r>
-                  <a:rPr lang="en-US" sz="1000" dirty="0">
+                  </a:endParaRPr>
+                </a:p>
+                <a:p>
+                  <a:pPr algn="ctr"/>
+                  <a:endParaRPr lang="en-US" sz="1000" dirty="0">
                     <a:solidFill>
                       <a:schemeClr val="tx1"/>
                     </a:solidFill>
                     <a:latin typeface="Calibri Light" charset="0"/>
                     <a:ea typeface="Calibri Light" charset="0"/>
                     <a:cs typeface="Calibri Light" charset="0"/>
-                  </a:rPr>
-                  <a:t>Language/API: OpenCL, CUDA, OpenMP</a:t>
-                </a:r>
-                <a:r>
-                  <a:rPr lang="en-US" sz="1000">
+                  </a:endParaRPr>
+                </a:p>
+                <a:p>
+                  <a:pPr algn="ctr"/>
+                  <a:endParaRPr lang="en-US" sz="1000" dirty="0">
                     <a:solidFill>
                       <a:schemeClr val="tx1"/>
                     </a:solidFill>
                     <a:latin typeface="Calibri Light" charset="0"/>
                     <a:ea typeface="Calibri Light" charset="0"/>
                     <a:cs typeface="Calibri Light" charset="0"/>
-                  </a:rPr>
-                  <a:t>, Chapel</a:t>
-                </a:r>
-                <a:endParaRPr lang="en-US" sz="1000" dirty="0">
-                  <a:solidFill>
-                    <a:schemeClr val="tx1"/>
-                  </a:solidFill>
-                  <a:latin typeface="Calibri Light" charset="0"/>
-                  <a:ea typeface="Calibri Light" charset="0"/>
-                  <a:cs typeface="Calibri Light" charset="0"/>
-                </a:endParaRPr>
-              </a:p>
-            </p:txBody>
-          </p:sp>
-          <p:sp>
-            <p:nvSpPr>
-              <p:cNvPr id="18" name="Round Same Side Corner Rectangle 17"/>
-              <p:cNvSpPr/>
-              <p:nvPr/>
-            </p:nvSpPr>
-            <p:spPr>
-              <a:xfrm>
-                <a:off x="1131813" y="476249"/>
-                <a:ext cx="2144787" cy="393768"/>
-              </a:xfrm>
-              <a:prstGeom prst="round2SameRect">
-                <a:avLst/>
-              </a:prstGeom>
-              <a:solidFill>
-                <a:srgbClr val="CCFFCC"/>
-              </a:solidFill>
-              <a:ln w="12700" cmpd="sng" algn="ctr">
-                <a:solidFill>
-                  <a:schemeClr val="tx1"/>
-                </a:solidFill>
-                <a:round/>
-                <a:headEnd type="none" w="med" len="med"/>
-                <a:tailEnd w="med" len="med"/>
-              </a:ln>
-              <a:effectLst/>
-            </p:spPr>
-            <p:style>
-              <a:lnRef idx="1">
-                <a:schemeClr val="accent1"/>
-              </a:lnRef>
-              <a:fillRef idx="3">
-                <a:schemeClr val="accent1"/>
-              </a:fillRef>
-              <a:effectRef idx="2">
-                <a:schemeClr val="accent1"/>
-              </a:effectRef>
-              <a:fontRef idx="minor">
-                <a:schemeClr val="lt1"/>
-              </a:fontRef>
-            </p:style>
-            <p:txBody>
-              <a:bodyPr rtlCol="0" anchor="ctr"/>
-              <a:lstStyle/>
-              <a:p>
-                <a:pPr algn="ctr"/>
-                <a:r>
-                  <a:rPr lang="en-US" sz="1100" b="1" dirty="0">
+                  </a:endParaRPr>
+                </a:p>
+                <a:p>
+                  <a:pPr algn="ctr"/>
+                  <a:r>
+                    <a:rPr lang="en-US" sz="1000" dirty="0">
+                      <a:solidFill>
+                        <a:schemeClr val="tx1"/>
+                      </a:solidFill>
+                      <a:latin typeface="Calibri Light" charset="0"/>
+                      <a:ea typeface="Calibri Light" charset="0"/>
+                      <a:cs typeface="Calibri Light" charset="0"/>
+                    </a:rPr>
+                    <a:t>GPU Task Off-loading</a:t>
+                  </a:r>
+                </a:p>
+                <a:p>
+                  <a:pPr algn="ctr"/>
+                  <a:r>
+                    <a:rPr lang="en-US" sz="1000" dirty="0">
+                      <a:solidFill>
+                        <a:schemeClr val="tx1"/>
+                      </a:solidFill>
+                      <a:latin typeface="Calibri Light" charset="0"/>
+                      <a:ea typeface="Calibri Light" charset="0"/>
+                      <a:cs typeface="Calibri Light" charset="0"/>
+                    </a:rPr>
+                    <a:t>Language/API: OpenCL, CUDA, OpenMP</a:t>
+                  </a:r>
+                  <a:r>
+                    <a:rPr lang="en-US" sz="1000">
+                      <a:solidFill>
+                        <a:schemeClr val="tx1"/>
+                      </a:solidFill>
+                      <a:latin typeface="Calibri Light" charset="0"/>
+                      <a:ea typeface="Calibri Light" charset="0"/>
+                      <a:cs typeface="Calibri Light" charset="0"/>
+                    </a:rPr>
+                    <a:t>, Chapel</a:t>
+                  </a:r>
+                  <a:endParaRPr lang="en-US" sz="1000" dirty="0">
                     <a:solidFill>
                       <a:schemeClr val="tx1"/>
                     </a:solidFill>
                     <a:latin typeface="Calibri Light" charset="0"/>
                     <a:ea typeface="Calibri Light" charset="0"/>
                     <a:cs typeface="Calibri Light" charset="0"/>
-                  </a:rPr>
-                  <a:t>D. Programming Models</a:t>
-                </a:r>
-              </a:p>
-            </p:txBody>
-          </p:sp>
-        </p:grpSp>
-        <p:grpSp>
-          <p:nvGrpSpPr>
-            <p:cNvPr id="6" name="Group 18"/>
-            <p:cNvGrpSpPr/>
-            <p:nvPr/>
-          </p:nvGrpSpPr>
-          <p:grpSpPr>
-            <a:xfrm>
-              <a:off x="3124200" y="1574800"/>
-              <a:ext cx="1436609" cy="1374068"/>
-              <a:chOff x="1447800" y="492358"/>
-              <a:chExt cx="1436609" cy="862982"/>
-            </a:xfrm>
-            <a:effectLst/>
-          </p:grpSpPr>
-          <p:sp>
-            <p:nvSpPr>
-              <p:cNvPr id="20" name="Rounded Rectangle 19"/>
-              <p:cNvSpPr/>
+                  </a:endParaRPr>
+                </a:p>
+              </p:txBody>
+            </p:sp>
+            <p:sp>
+              <p:nvSpPr>
+                <p:cNvPr id="18" name="Round Same Side Corner Rectangle 17"/>
+                <p:cNvSpPr/>
+                <p:nvPr/>
+              </p:nvSpPr>
+              <p:spPr>
+                <a:xfrm>
+                  <a:off x="1131813" y="476249"/>
+                  <a:ext cx="2144787" cy="393768"/>
+                </a:xfrm>
+                <a:prstGeom prst="round2SameRect">
+                  <a:avLst/>
+                </a:prstGeom>
+                <a:solidFill>
+                  <a:srgbClr val="CCFFCC"/>
+                </a:solidFill>
+                <a:ln w="12700" cmpd="sng" algn="ctr">
+                  <a:solidFill>
+                    <a:schemeClr val="tx1"/>
+                  </a:solidFill>
+                  <a:round/>
+                  <a:headEnd type="none" w="med" len="med"/>
+                  <a:tailEnd w="med" len="med"/>
+                </a:ln>
+                <a:effectLst/>
+              </p:spPr>
+              <p:style>
+                <a:lnRef idx="1">
+                  <a:schemeClr val="accent1"/>
+                </a:lnRef>
+                <a:fillRef idx="3">
+                  <a:schemeClr val="accent1"/>
+                </a:fillRef>
+                <a:effectRef idx="2">
+                  <a:schemeClr val="accent1"/>
+                </a:effectRef>
+                <a:fontRef idx="minor">
+                  <a:schemeClr val="lt1"/>
+                </a:fontRef>
+              </p:style>
+              <p:txBody>
+                <a:bodyPr rtlCol="0" anchor="ctr"/>
+                <a:lstStyle/>
+                <a:p>
+                  <a:pPr algn="ctr"/>
+                  <a:r>
+                    <a:rPr lang="en-US" sz="1100" b="1" dirty="0">
+                      <a:solidFill>
+                        <a:schemeClr val="tx1"/>
+                      </a:solidFill>
+                      <a:latin typeface="Calibri Light" charset="0"/>
+                      <a:ea typeface="Calibri Light" charset="0"/>
+                      <a:cs typeface="Calibri Light" charset="0"/>
+                    </a:rPr>
+                    <a:t>D. Programming Models</a:t>
+                  </a:r>
+                </a:p>
+              </p:txBody>
+            </p:sp>
+          </p:grpSp>
+          <p:grpSp>
+            <p:nvGrpSpPr>
+              <p:cNvPr id="6" name="Group 18"/>
+              <p:cNvGrpSpPr/>
               <p:nvPr/>
-            </p:nvSpPr>
-            <p:spPr>
+            </p:nvGrpSpPr>
+            <p:grpSpPr>
               <a:xfrm>
-                <a:off x="1447801" y="492360"/>
-                <a:ext cx="1436608" cy="862980"/>
+                <a:off x="3251512" y="2207610"/>
+                <a:ext cx="1531297" cy="1196562"/>
+                <a:chOff x="1447800" y="492358"/>
+                <a:chExt cx="1436609" cy="862982"/>
               </a:xfrm>
-              <a:prstGeom prst="roundRect">
-                <a:avLst/>
-              </a:prstGeom>
-              <a:noFill/>
-              <a:ln w="12700" cap="sq" cmpd="sng" algn="ctr">
-                <a:solidFill>
-                  <a:schemeClr val="tx1"/>
-                </a:solidFill>
-                <a:round/>
-                <a:headEnd type="none" w="med" len="med"/>
-                <a:tailEnd w="med" len="med"/>
-              </a:ln>
               <a:effectLst/>
-            </p:spPr>
-            <p:style>
-              <a:lnRef idx="1">
-                <a:schemeClr val="accent1"/>
-              </a:lnRef>
-              <a:fillRef idx="3">
-                <a:schemeClr val="accent1"/>
-              </a:fillRef>
-              <a:effectRef idx="2">
-                <a:schemeClr val="accent1"/>
-              </a:effectRef>
-              <a:fontRef idx="minor">
-                <a:schemeClr val="lt1"/>
-              </a:fontRef>
-            </p:style>
-            <p:txBody>
-              <a:bodyPr rtlCol="0" anchor="t"/>
-              <a:lstStyle/>
-              <a:p>
-                <a:pPr algn="ctr"/>
-                <a:br>
-                  <a:rPr lang="en-US" sz="1000" dirty="0">
+            </p:grpSpPr>
+            <p:sp>
+              <p:nvSpPr>
+                <p:cNvPr id="20" name="Rounded Rectangle 19"/>
+                <p:cNvSpPr/>
+                <p:nvPr/>
+              </p:nvSpPr>
+              <p:spPr>
+                <a:xfrm>
+                  <a:off x="1447801" y="492360"/>
+                  <a:ext cx="1436608" cy="862980"/>
+                </a:xfrm>
+                <a:prstGeom prst="roundRect">
+                  <a:avLst/>
+                </a:prstGeom>
+                <a:noFill/>
+                <a:ln w="12700" cap="sq" cmpd="sng" algn="ctr">
+                  <a:solidFill>
+                    <a:schemeClr val="tx1"/>
+                  </a:solidFill>
+                  <a:round/>
+                  <a:headEnd type="none" w="med" len="med"/>
+                  <a:tailEnd w="med" len="med"/>
+                </a:ln>
+                <a:effectLst/>
+              </p:spPr>
+              <p:style>
+                <a:lnRef idx="1">
+                  <a:schemeClr val="accent1"/>
+                </a:lnRef>
+                <a:fillRef idx="3">
+                  <a:schemeClr val="accent1"/>
+                </a:fillRef>
+                <a:effectRef idx="2">
+                  <a:schemeClr val="accent1"/>
+                </a:effectRef>
+                <a:fontRef idx="minor">
+                  <a:schemeClr val="lt1"/>
+                </a:fontRef>
+              </p:style>
+              <p:txBody>
+                <a:bodyPr rtlCol="0" anchor="t"/>
+                <a:lstStyle/>
+                <a:p>
+                  <a:pPr algn="ctr"/>
+                  <a:br>
+                    <a:rPr lang="en-US" sz="1000" dirty="0">
+                      <a:solidFill>
+                        <a:schemeClr val="tx1"/>
+                      </a:solidFill>
+                      <a:latin typeface="Calibri Light" charset="0"/>
+                      <a:ea typeface="Calibri Light" charset="0"/>
+                      <a:cs typeface="Calibri Light" charset="0"/>
+                    </a:rPr>
+                  </a:br>
+                  <a:endParaRPr lang="en-US" sz="1000" dirty="0">
                     <a:solidFill>
                       <a:schemeClr val="tx1"/>
                     </a:solidFill>
                     <a:latin typeface="Calibri Light" charset="0"/>
                     <a:ea typeface="Calibri Light" charset="0"/>
                     <a:cs typeface="Calibri Light" charset="0"/>
-                  </a:rPr>
-                </a:br>
-                <a:endParaRPr lang="en-US" sz="1000" dirty="0">
-                  <a:solidFill>
-                    <a:schemeClr val="tx1"/>
-                  </a:solidFill>
-                  <a:latin typeface="Calibri Light" charset="0"/>
-                  <a:ea typeface="Calibri Light" charset="0"/>
-                  <a:cs typeface="Calibri Light" charset="0"/>
-                </a:endParaRPr>
-              </a:p>
-              <a:p>
-                <a:pPr algn="ctr"/>
-                <a:br>
-                  <a:rPr lang="en-US" sz="1000" dirty="0">
+                  </a:endParaRPr>
+                </a:p>
+                <a:p>
+                  <a:pPr algn="ctr"/>
+                  <a:br>
+                    <a:rPr lang="en-US" sz="1000" dirty="0">
+                      <a:solidFill>
+                        <a:schemeClr val="tx1"/>
+                      </a:solidFill>
+                      <a:latin typeface="Calibri Light" charset="0"/>
+                      <a:ea typeface="Calibri Light" charset="0"/>
+                      <a:cs typeface="Calibri Light" charset="0"/>
+                    </a:rPr>
+                  </a:br>
+                  <a:r>
+                    <a:rPr lang="en-US" sz="1000" dirty="0">
+                      <a:solidFill>
+                        <a:schemeClr val="tx1"/>
+                      </a:solidFill>
+                      <a:latin typeface="Calibri Light" charset="0"/>
+                      <a:ea typeface="Calibri Light" charset="0"/>
+                      <a:cs typeface="Calibri Light" charset="0"/>
+                    </a:rPr>
+                    <a:t>ISA  Diversity: ARM</a:t>
+                  </a:r>
+                </a:p>
+                <a:p>
+                  <a:pPr algn="ctr"/>
+                  <a:r>
+                    <a:rPr lang="en-US" sz="1000" dirty="0">
+                      <a:solidFill>
+                        <a:schemeClr val="tx1"/>
+                      </a:solidFill>
+                      <a:latin typeface="Calibri Light" charset="0"/>
+                      <a:ea typeface="Calibri Light" charset="0"/>
+                      <a:cs typeface="Calibri Light" charset="0"/>
+                    </a:rPr>
+                    <a:t>GPU Memory Hierarchy</a:t>
+                  </a:r>
+                </a:p>
+                <a:p>
+                  <a:pPr algn="ctr"/>
+                  <a:r>
+                    <a:rPr lang="en-US" sz="1000" dirty="0">
+                      <a:solidFill>
+                        <a:schemeClr val="tx1"/>
+                      </a:solidFill>
+                      <a:latin typeface="Calibri Light" charset="0"/>
+                      <a:ea typeface="Calibri Light" charset="0"/>
+                      <a:cs typeface="Calibri Light" charset="0"/>
+                    </a:rPr>
+                    <a:t>Embedded Systems</a:t>
+                  </a:r>
+                </a:p>
+                <a:p>
+                  <a:pPr algn="ctr"/>
+                  <a:r>
+                    <a:rPr lang="en-US" sz="1000" dirty="0">
+                      <a:solidFill>
+                        <a:schemeClr val="tx1"/>
+                      </a:solidFill>
+                      <a:latin typeface="Calibri Light" charset="0"/>
+                      <a:ea typeface="Calibri Light" charset="0"/>
+                      <a:cs typeface="Calibri Light" charset="0"/>
+                    </a:rPr>
+                    <a:t>Coherence  Protocol</a:t>
+                  </a:r>
+                </a:p>
+                <a:p>
+                  <a:pPr algn="ctr"/>
+                  <a:endParaRPr lang="en-US" sz="1000" dirty="0">
                     <a:solidFill>
                       <a:schemeClr val="tx1"/>
                     </a:solidFill>
                     <a:latin typeface="Calibri Light" charset="0"/>
                     <a:ea typeface="Calibri Light" charset="0"/>
                     <a:cs typeface="Calibri Light" charset="0"/>
-                  </a:rPr>
-                </a:br>
-                <a:r>
-                  <a:rPr lang="en-US" sz="1000" dirty="0">
+                  </a:endParaRPr>
+                </a:p>
+                <a:p>
+                  <a:pPr algn="ctr"/>
+                  <a:endParaRPr lang="en-US" sz="1100" dirty="0">
                     <a:solidFill>
                       <a:schemeClr val="tx1"/>
                     </a:solidFill>
                     <a:latin typeface="Calibri Light" charset="0"/>
                     <a:ea typeface="Calibri Light" charset="0"/>
                     <a:cs typeface="Calibri Light" charset="0"/>
-                  </a:rPr>
-                  <a:t>ISA  Diversity: ARM</a:t>
-                </a:r>
-              </a:p>
-              <a:p>
-                <a:pPr algn="ctr"/>
-                <a:r>
-                  <a:rPr lang="en-US" sz="1000" dirty="0">
+                  </a:endParaRPr>
+                </a:p>
+              </p:txBody>
+            </p:sp>
+            <p:sp>
+              <p:nvSpPr>
+                <p:cNvPr id="21" name="Round Same Side Corner Rectangle 20"/>
+                <p:cNvSpPr/>
+                <p:nvPr/>
+              </p:nvSpPr>
+              <p:spPr>
+                <a:xfrm>
+                  <a:off x="1447800" y="492358"/>
+                  <a:ext cx="1436609" cy="329741"/>
+                </a:xfrm>
+                <a:prstGeom prst="round2SameRect">
+                  <a:avLst/>
+                </a:prstGeom>
+                <a:solidFill>
+                  <a:srgbClr val="CCFFCC"/>
+                </a:solidFill>
+                <a:ln w="12700" cmpd="sng" algn="ctr">
+                  <a:solidFill>
+                    <a:schemeClr val="tx1"/>
+                  </a:solidFill>
+                  <a:round/>
+                  <a:headEnd type="none" w="med" len="med"/>
+                  <a:tailEnd w="med" len="med"/>
+                </a:ln>
+                <a:effectLst/>
+              </p:spPr>
+              <p:style>
+                <a:lnRef idx="1">
+                  <a:schemeClr val="accent1"/>
+                </a:lnRef>
+                <a:fillRef idx="3">
+                  <a:schemeClr val="accent1"/>
+                </a:fillRef>
+                <a:effectRef idx="2">
+                  <a:schemeClr val="accent1"/>
+                </a:effectRef>
+                <a:fontRef idx="minor">
+                  <a:schemeClr val="lt1"/>
+                </a:fontRef>
+              </p:style>
+              <p:txBody>
+                <a:bodyPr rtlCol="0" anchor="ctr"/>
+                <a:lstStyle/>
+                <a:p>
+                  <a:pPr algn="ctr"/>
+                  <a:r>
+                    <a:rPr lang="en-US" sz="1100" b="1" dirty="0">
+                      <a:solidFill>
+                        <a:schemeClr val="tx1"/>
+                      </a:solidFill>
+                      <a:latin typeface="Calibri Light" charset="0"/>
+                      <a:ea typeface="Calibri Light" charset="0"/>
+                      <a:cs typeface="Calibri Light" charset="0"/>
+                    </a:rPr>
+                    <a:t>C. Architecture</a:t>
+                  </a:r>
+                </a:p>
+              </p:txBody>
+            </p:sp>
+          </p:grpSp>
+          <p:grpSp>
+            <p:nvGrpSpPr>
+              <p:cNvPr id="7" name="Group 96"/>
+              <p:cNvGrpSpPr/>
+              <p:nvPr/>
+            </p:nvGrpSpPr>
+            <p:grpSpPr>
+              <a:xfrm>
+                <a:off x="7393857" y="1067643"/>
+                <a:ext cx="1303901" cy="2336527"/>
+                <a:chOff x="6436999" y="196976"/>
+                <a:chExt cx="1226862" cy="2466531"/>
+              </a:xfrm>
+              <a:effectLst/>
+            </p:grpSpPr>
+            <p:sp>
+              <p:nvSpPr>
+                <p:cNvPr id="27" name="Rounded Rectangle 26"/>
+                <p:cNvSpPr/>
+                <p:nvPr/>
+              </p:nvSpPr>
+              <p:spPr>
+                <a:xfrm>
+                  <a:off x="6437000" y="196977"/>
+                  <a:ext cx="1226861" cy="2466530"/>
+                </a:xfrm>
+                <a:prstGeom prst="roundRect">
+                  <a:avLst/>
+                </a:prstGeom>
+                <a:noFill/>
+                <a:ln w="12700" cap="sq" cmpd="sng" algn="ctr">
+                  <a:solidFill>
+                    <a:schemeClr val="tx1"/>
+                  </a:solidFill>
+                  <a:round/>
+                  <a:headEnd type="none" w="med" len="med"/>
+                  <a:tailEnd w="med" len="med"/>
+                </a:ln>
+                <a:effectLst/>
+              </p:spPr>
+              <p:style>
+                <a:lnRef idx="1">
+                  <a:schemeClr val="accent1"/>
+                </a:lnRef>
+                <a:fillRef idx="3">
+                  <a:schemeClr val="accent1"/>
+                </a:fillRef>
+                <a:effectRef idx="2">
+                  <a:schemeClr val="accent1"/>
+                </a:effectRef>
+                <a:fontRef idx="minor">
+                  <a:schemeClr val="lt1"/>
+                </a:fontRef>
+              </p:style>
+              <p:txBody>
+                <a:bodyPr rtlCol="0" anchor="ctr"/>
+                <a:lstStyle/>
+                <a:p>
+                  <a:pPr algn="ctr"/>
+                  <a:endParaRPr lang="en-US" sz="1000" dirty="0">
                     <a:solidFill>
                       <a:schemeClr val="tx1"/>
                     </a:solidFill>
                     <a:latin typeface="Calibri Light" charset="0"/>
                     <a:ea typeface="Calibri Light" charset="0"/>
                     <a:cs typeface="Calibri Light" charset="0"/>
-                  </a:rPr>
-                  <a:t>GPU Memory Hierarchy</a:t>
-                </a:r>
-              </a:p>
-              <a:p>
-                <a:pPr algn="ctr"/>
-                <a:r>
-                  <a:rPr lang="en-US" sz="1000" dirty="0">
+                  </a:endParaRPr>
+                </a:p>
+                <a:p>
+                  <a:pPr algn="ctr"/>
+                  <a:endParaRPr lang="en-US" sz="1000" dirty="0">
                     <a:solidFill>
                       <a:schemeClr val="tx1"/>
                     </a:solidFill>
                     <a:latin typeface="Calibri Light" charset="0"/>
                     <a:ea typeface="Calibri Light" charset="0"/>
                     <a:cs typeface="Calibri Light" charset="0"/>
-                  </a:rPr>
-                  <a:t>Embedded Systems</a:t>
-                </a:r>
-              </a:p>
-              <a:p>
-                <a:pPr algn="ctr"/>
-                <a:r>
-                  <a:rPr lang="en-US" sz="1000" dirty="0">
+                  </a:endParaRPr>
+                </a:p>
+                <a:p>
+                  <a:pPr algn="ctr"/>
+                  <a:r>
+                    <a:rPr lang="en-US" sz="1000" dirty="0">
+                      <a:solidFill>
+                        <a:schemeClr val="tx1"/>
+                      </a:solidFill>
+                      <a:latin typeface="Calibri Light" charset="0"/>
+                      <a:ea typeface="Calibri Light" charset="0"/>
+                      <a:cs typeface="Calibri Light" charset="0"/>
+                    </a:rPr>
+                    <a:t>Speedup</a:t>
+                  </a:r>
+                </a:p>
+                <a:p>
+                  <a:pPr algn="ctr"/>
+                  <a:r>
+                    <a:rPr lang="en-US" sz="1000" dirty="0">
+                      <a:solidFill>
+                        <a:schemeClr val="tx1"/>
+                      </a:solidFill>
+                      <a:latin typeface="Calibri Light" charset="0"/>
+                      <a:ea typeface="Calibri Light" charset="0"/>
+                      <a:cs typeface="Calibri Light" charset="0"/>
+                    </a:rPr>
+                    <a:t>Efficiency</a:t>
+                  </a:r>
+                </a:p>
+                <a:p>
+                  <a:pPr algn="ctr"/>
+                  <a:r>
+                    <a:rPr lang="en-US" sz="1000" dirty="0">
+                      <a:solidFill>
+                        <a:schemeClr val="tx1"/>
+                      </a:solidFill>
+                      <a:latin typeface="Calibri Light" charset="0"/>
+                      <a:ea typeface="Calibri Light" charset="0"/>
+                      <a:cs typeface="Calibri Light" charset="0"/>
+                    </a:rPr>
+                    <a:t>Power</a:t>
+                  </a:r>
+                </a:p>
+                <a:p>
+                  <a:pPr algn="ctr"/>
+                  <a:r>
+                    <a:rPr lang="en-US" sz="1000" dirty="0">
+                      <a:solidFill>
+                        <a:schemeClr val="tx1"/>
+                      </a:solidFill>
+                      <a:latin typeface="Calibri Light" charset="0"/>
+                      <a:ea typeface="Calibri Light" charset="0"/>
+                      <a:cs typeface="Calibri Light" charset="0"/>
+                    </a:rPr>
+                    <a:t>Scalability</a:t>
+                  </a:r>
+                </a:p>
+                <a:p>
+                  <a:pPr algn="ctr"/>
+                  <a:r>
+                    <a:rPr lang="en-US" sz="1000" dirty="0">
+                      <a:solidFill>
+                        <a:schemeClr val="tx1"/>
+                      </a:solidFill>
+                      <a:latin typeface="Calibri Light" charset="0"/>
+                      <a:ea typeface="Calibri Light" charset="0"/>
+                      <a:cs typeface="Calibri Light" charset="0"/>
+                    </a:rPr>
+                    <a:t>Load Balancing</a:t>
+                  </a:r>
+                </a:p>
+                <a:p>
+                  <a:pPr algn="ctr"/>
+                  <a:r>
+                    <a:rPr lang="en-US" sz="1000" dirty="0">
+                      <a:solidFill>
+                        <a:schemeClr val="tx1"/>
+                      </a:solidFill>
+                      <a:latin typeface="Calibri Light" charset="0"/>
+                      <a:ea typeface="Calibri Light" charset="0"/>
+                      <a:cs typeface="Calibri Light" charset="0"/>
+                    </a:rPr>
+                    <a:t>Data Locality</a:t>
+                  </a:r>
+                </a:p>
+                <a:p>
+                  <a:pPr algn="ctr"/>
+                  <a:r>
+                    <a:rPr lang="en-US" sz="1000" dirty="0">
+                      <a:solidFill>
+                        <a:schemeClr val="tx1"/>
+                      </a:solidFill>
+                      <a:latin typeface="Calibri Light" charset="0"/>
+                      <a:ea typeface="Calibri Light" charset="0"/>
+                      <a:cs typeface="Calibri Light" charset="0"/>
+                    </a:rPr>
+                    <a:t>Data Movement</a:t>
+                  </a:r>
+                </a:p>
+              </p:txBody>
+            </p:sp>
+            <p:sp>
+              <p:nvSpPr>
+                <p:cNvPr id="28" name="Round Same Side Corner Rectangle 27"/>
+                <p:cNvSpPr/>
+                <p:nvPr/>
+              </p:nvSpPr>
+              <p:spPr>
+                <a:xfrm>
+                  <a:off x="6436999" y="196976"/>
+                  <a:ext cx="1226861" cy="482639"/>
+                </a:xfrm>
+                <a:prstGeom prst="round2SameRect">
+                  <a:avLst/>
+                </a:prstGeom>
+                <a:solidFill>
+                  <a:srgbClr val="CCFFCC"/>
+                </a:solidFill>
+                <a:ln w="12700" cmpd="sng" algn="ctr">
+                  <a:solidFill>
+                    <a:schemeClr val="tx1"/>
+                  </a:solidFill>
+                  <a:round/>
+                  <a:headEnd type="none" w="med" len="med"/>
+                  <a:tailEnd w="med" len="med"/>
+                </a:ln>
+                <a:effectLst/>
+              </p:spPr>
+              <p:style>
+                <a:lnRef idx="1">
+                  <a:schemeClr val="accent1"/>
+                </a:lnRef>
+                <a:fillRef idx="3">
+                  <a:schemeClr val="accent1"/>
+                </a:fillRef>
+                <a:effectRef idx="2">
+                  <a:schemeClr val="accent1"/>
+                </a:effectRef>
+                <a:fontRef idx="minor">
+                  <a:schemeClr val="lt1"/>
+                </a:fontRef>
+              </p:style>
+              <p:txBody>
+                <a:bodyPr rtlCol="0" anchor="ctr"/>
+                <a:lstStyle/>
+                <a:p>
+                  <a:pPr algn="ctr"/>
+                  <a:r>
+                    <a:rPr lang="en-US" sz="1100" b="1" dirty="0">
+                      <a:solidFill>
+                        <a:schemeClr val="tx1"/>
+                      </a:solidFill>
+                      <a:latin typeface="Calibri Light" charset="0"/>
+                      <a:ea typeface="Calibri Light" charset="0"/>
+                      <a:cs typeface="Calibri Light" charset="0"/>
+                    </a:rPr>
+                    <a:t>E. Performance</a:t>
+                  </a:r>
+                </a:p>
+              </p:txBody>
+            </p:sp>
+          </p:grpSp>
+          <p:cxnSp>
+            <p:nvCxnSpPr>
+              <p:cNvPr id="31" name="Straight Arrow Connector 30"/>
+              <p:cNvCxnSpPr/>
+              <p:nvPr/>
+            </p:nvCxnSpPr>
+            <p:spPr>
+              <a:xfrm flipV="1">
+                <a:off x="954271" y="1101673"/>
+                <a:ext cx="0" cy="2302497"/>
+              </a:xfrm>
+              <a:prstGeom prst="straightConnector1">
+                <a:avLst/>
+              </a:prstGeom>
+              <a:ln w="12700" cmpd="sng" algn="ctr">
+                <a:solidFill>
+                  <a:srgbClr val="000000"/>
+                </a:solidFill>
+                <a:round/>
+                <a:headEnd type="none" w="med" len="med"/>
+                <a:tailEnd type="arrow" w="med" len="med"/>
+              </a:ln>
+              <a:effectLst/>
+            </p:spPr>
+            <p:style>
+              <a:lnRef idx="2">
+                <a:schemeClr val="accent1"/>
+              </a:lnRef>
+              <a:fillRef idx="0">
+                <a:schemeClr val="accent1"/>
+              </a:fillRef>
+              <a:effectRef idx="1">
+                <a:schemeClr val="accent1"/>
+              </a:effectRef>
+              <a:fontRef idx="minor">
+                <a:schemeClr val="tx1"/>
+              </a:fontRef>
+            </p:style>
+          </p:cxnSp>
+          <p:grpSp>
+            <p:nvGrpSpPr>
+              <p:cNvPr id="55" name="Group 11"/>
+              <p:cNvGrpSpPr/>
+              <p:nvPr/>
+            </p:nvGrpSpPr>
+            <p:grpSpPr>
+              <a:xfrm>
+                <a:off x="1302174" y="1067644"/>
+                <a:ext cx="6010459" cy="563587"/>
+                <a:chOff x="1447800" y="762000"/>
+                <a:chExt cx="1828800" cy="800309"/>
+              </a:xfrm>
+              <a:effectLst/>
+            </p:grpSpPr>
+            <p:sp>
+              <p:nvSpPr>
+                <p:cNvPr id="56" name="Rounded Rectangle 55"/>
+                <p:cNvSpPr/>
+                <p:nvPr/>
+              </p:nvSpPr>
+              <p:spPr>
+                <a:xfrm>
+                  <a:off x="1447800" y="762001"/>
+                  <a:ext cx="1828800" cy="800308"/>
+                </a:xfrm>
+                <a:prstGeom prst="roundRect">
+                  <a:avLst/>
+                </a:prstGeom>
+                <a:noFill/>
+                <a:ln w="12700" cap="sq" cmpd="sng" algn="ctr">
+                  <a:solidFill>
+                    <a:schemeClr val="tx1"/>
+                  </a:solidFill>
+                  <a:round/>
+                  <a:headEnd type="none" w="med" len="med"/>
+                  <a:tailEnd w="med" len="med"/>
+                </a:ln>
+                <a:effectLst/>
+              </p:spPr>
+              <p:style>
+                <a:lnRef idx="1">
+                  <a:schemeClr val="accent1"/>
+                </a:lnRef>
+                <a:fillRef idx="3">
+                  <a:schemeClr val="accent1"/>
+                </a:fillRef>
+                <a:effectRef idx="2">
+                  <a:schemeClr val="accent1"/>
+                </a:effectRef>
+                <a:fontRef idx="minor">
+                  <a:schemeClr val="lt1"/>
+                </a:fontRef>
+              </p:style>
+              <p:txBody>
+                <a:bodyPr rtlCol="0" anchor="ctr"/>
+                <a:lstStyle/>
+                <a:p>
+                  <a:pPr algn="ctr"/>
+                  <a:endParaRPr lang="en-US" sz="800" dirty="0">
                     <a:solidFill>
                       <a:schemeClr val="tx1"/>
                     </a:solidFill>
                     <a:latin typeface="Calibri Light" charset="0"/>
                     <a:ea typeface="Calibri Light" charset="0"/>
                     <a:cs typeface="Calibri Light" charset="0"/>
-                  </a:rPr>
-                  <a:t>Coherence  Protocol</a:t>
-                </a:r>
-              </a:p>
-              <a:p>
-                <a:pPr algn="ctr"/>
-                <a:endParaRPr lang="en-US" sz="1000" dirty="0">
-                  <a:solidFill>
-                    <a:schemeClr val="tx1"/>
-                  </a:solidFill>
-                  <a:latin typeface="Calibri Light" charset="0"/>
-                  <a:ea typeface="Calibri Light" charset="0"/>
-                  <a:cs typeface="Calibri Light" charset="0"/>
-                </a:endParaRPr>
-              </a:p>
-              <a:p>
-                <a:pPr algn="ctr"/>
-                <a:endParaRPr lang="en-US" sz="1100" dirty="0">
-                  <a:solidFill>
-                    <a:schemeClr val="tx1"/>
-                  </a:solidFill>
-                  <a:latin typeface="Calibri Light" charset="0"/>
-                  <a:ea typeface="Calibri Light" charset="0"/>
-                  <a:cs typeface="Calibri Light" charset="0"/>
-                </a:endParaRPr>
-              </a:p>
-            </p:txBody>
-          </p:sp>
-          <p:sp>
-            <p:nvSpPr>
-              <p:cNvPr id="21" name="Round Same Side Corner Rectangle 20"/>
-              <p:cNvSpPr/>
-              <p:nvPr/>
-            </p:nvSpPr>
-            <p:spPr>
-              <a:xfrm>
-                <a:off x="1447800" y="492358"/>
-                <a:ext cx="1436609" cy="329741"/>
-              </a:xfrm>
-              <a:prstGeom prst="round2SameRect">
-                <a:avLst/>
-              </a:prstGeom>
-              <a:solidFill>
-                <a:srgbClr val="CCFFCC"/>
-              </a:solidFill>
-              <a:ln w="12700" cmpd="sng" algn="ctr">
-                <a:solidFill>
-                  <a:schemeClr val="tx1"/>
-                </a:solidFill>
-                <a:round/>
-                <a:headEnd type="none" w="med" len="med"/>
-                <a:tailEnd w="med" len="med"/>
-              </a:ln>
-              <a:effectLst/>
-            </p:spPr>
-            <p:style>
-              <a:lnRef idx="1">
-                <a:schemeClr val="accent1"/>
-              </a:lnRef>
-              <a:fillRef idx="3">
-                <a:schemeClr val="accent1"/>
-              </a:fillRef>
-              <a:effectRef idx="2">
-                <a:schemeClr val="accent1"/>
-              </a:effectRef>
-              <a:fontRef idx="minor">
-                <a:schemeClr val="lt1"/>
-              </a:fontRef>
-            </p:style>
-            <p:txBody>
-              <a:bodyPr rtlCol="0" anchor="ctr"/>
-              <a:lstStyle/>
-              <a:p>
-                <a:pPr algn="ctr"/>
-                <a:r>
-                  <a:rPr lang="en-US" sz="1100" b="1" dirty="0">
+                  </a:endParaRPr>
+                </a:p>
+                <a:p>
+                  <a:pPr algn="ctr"/>
+                  <a:endParaRPr lang="en-US" sz="800" dirty="0">
                     <a:solidFill>
                       <a:schemeClr val="tx1"/>
                     </a:solidFill>
                     <a:latin typeface="Calibri Light" charset="0"/>
                     <a:ea typeface="Calibri Light" charset="0"/>
                     <a:cs typeface="Calibri Light" charset="0"/>
-                  </a:rPr>
-                  <a:t>C. Architecture</a:t>
-                </a:r>
-              </a:p>
-            </p:txBody>
-          </p:sp>
-        </p:grpSp>
-        <p:grpSp>
-          <p:nvGrpSpPr>
-            <p:cNvPr id="7" name="Group 96"/>
-            <p:cNvGrpSpPr/>
-            <p:nvPr/>
-          </p:nvGrpSpPr>
-          <p:grpSpPr>
-            <a:xfrm>
-              <a:off x="7010401" y="265722"/>
-              <a:ext cx="1223274" cy="2683144"/>
-              <a:chOff x="6436999" y="196976"/>
-              <a:chExt cx="1226862" cy="2466531"/>
-            </a:xfrm>
-            <a:effectLst/>
-          </p:grpSpPr>
-          <p:sp>
-            <p:nvSpPr>
-              <p:cNvPr id="27" name="Rounded Rectangle 26"/>
-              <p:cNvSpPr/>
-              <p:nvPr/>
-            </p:nvSpPr>
-            <p:spPr>
-              <a:xfrm>
-                <a:off x="6437000" y="196977"/>
-                <a:ext cx="1226861" cy="2466530"/>
-              </a:xfrm>
-              <a:prstGeom prst="roundRect">
-                <a:avLst/>
-              </a:prstGeom>
-              <a:noFill/>
-              <a:ln w="12700" cap="sq" cmpd="sng" algn="ctr">
-                <a:solidFill>
-                  <a:schemeClr val="tx1"/>
-                </a:solidFill>
-                <a:round/>
-                <a:headEnd type="none" w="med" len="med"/>
-                <a:tailEnd w="med" len="med"/>
-              </a:ln>
-              <a:effectLst/>
-            </p:spPr>
-            <p:style>
-              <a:lnRef idx="1">
-                <a:schemeClr val="accent1"/>
-              </a:lnRef>
-              <a:fillRef idx="3">
-                <a:schemeClr val="accent1"/>
-              </a:fillRef>
-              <a:effectRef idx="2">
-                <a:schemeClr val="accent1"/>
-              </a:effectRef>
-              <a:fontRef idx="minor">
-                <a:schemeClr val="lt1"/>
-              </a:fontRef>
-            </p:style>
-            <p:txBody>
-              <a:bodyPr rtlCol="0" anchor="ctr"/>
-              <a:lstStyle/>
-              <a:p>
-                <a:pPr algn="ctr"/>
-                <a:endParaRPr lang="en-US" sz="1000" dirty="0">
-                  <a:solidFill>
-                    <a:schemeClr val="tx1"/>
-                  </a:solidFill>
-                  <a:latin typeface="Calibri Light" charset="0"/>
-                  <a:ea typeface="Calibri Light" charset="0"/>
-                  <a:cs typeface="Calibri Light" charset="0"/>
-                </a:endParaRPr>
-              </a:p>
-              <a:p>
-                <a:pPr algn="ctr"/>
-                <a:endParaRPr lang="en-US" sz="1000" dirty="0">
-                  <a:solidFill>
-                    <a:schemeClr val="tx1"/>
-                  </a:solidFill>
-                  <a:latin typeface="Calibri Light" charset="0"/>
-                  <a:ea typeface="Calibri Light" charset="0"/>
-                  <a:cs typeface="Calibri Light" charset="0"/>
-                </a:endParaRPr>
-              </a:p>
-              <a:p>
-                <a:pPr algn="ctr"/>
-                <a:r>
-                  <a:rPr lang="en-US" sz="1000" dirty="0">
+                  </a:endParaRPr>
+                </a:p>
+                <a:p>
+                  <a:pPr algn="ctr"/>
+                  <a:endParaRPr lang="en-US" sz="800" dirty="0">
                     <a:solidFill>
                       <a:schemeClr val="tx1"/>
                     </a:solidFill>
                     <a:latin typeface="Calibri Light" charset="0"/>
                     <a:ea typeface="Calibri Light" charset="0"/>
                     <a:cs typeface="Calibri Light" charset="0"/>
-                  </a:rPr>
-                  <a:t>Speedup</a:t>
-                </a:r>
-              </a:p>
-              <a:p>
-                <a:pPr algn="ctr"/>
-                <a:r>
-                  <a:rPr lang="en-US" sz="1000" dirty="0">
+                  </a:endParaRPr>
+                </a:p>
+                <a:p>
+                  <a:pPr algn="ctr"/>
+                  <a:br>
+                    <a:rPr lang="en-US" sz="1000" dirty="0">
+                      <a:solidFill>
+                        <a:schemeClr val="tx1"/>
+                      </a:solidFill>
+                      <a:latin typeface="Calibri Light" charset="0"/>
+                      <a:ea typeface="Calibri Light" charset="0"/>
+                      <a:cs typeface="Calibri Light" charset="0"/>
+                    </a:rPr>
+                  </a:br>
+                  <a:r>
+                    <a:rPr lang="en-US" sz="1000" dirty="0">
+                      <a:solidFill>
+                        <a:schemeClr val="tx1"/>
+                      </a:solidFill>
+                      <a:latin typeface="Calibri Light" charset="0"/>
+                      <a:ea typeface="Calibri Light" charset="0"/>
+                      <a:cs typeface="Calibri Light" charset="0"/>
+                    </a:rPr>
+                    <a:t>Concurrency and Parallelism,  Energy efficiency</a:t>
+                  </a:r>
+                </a:p>
+                <a:p>
+                  <a:pPr algn="ctr"/>
+                  <a:r>
+                    <a:rPr lang="en-US" sz="1000" dirty="0">
+                      <a:solidFill>
+                        <a:schemeClr val="tx1"/>
+                      </a:solidFill>
+                      <a:latin typeface="Calibri Light" charset="0"/>
+                      <a:ea typeface="Calibri Light" charset="0"/>
+                      <a:cs typeface="Calibri Light" charset="0"/>
+                    </a:rPr>
+                    <a:t>Forms of Heterogeneity, Amdahl’s Law and HC</a:t>
+                  </a:r>
+                </a:p>
+                <a:p>
+                  <a:pPr algn="ctr"/>
+                  <a:br>
+                    <a:rPr lang="en-US" sz="800" dirty="0">
+                      <a:solidFill>
+                        <a:schemeClr val="tx1"/>
+                      </a:solidFill>
+                      <a:latin typeface="Calibri Light" charset="0"/>
+                      <a:ea typeface="Calibri Light" charset="0"/>
+                      <a:cs typeface="Calibri Light" charset="0"/>
+                    </a:rPr>
+                  </a:br>
+                  <a:br>
+                    <a:rPr lang="en-US" sz="800" dirty="0">
+                      <a:solidFill>
+                        <a:schemeClr val="tx1"/>
+                      </a:solidFill>
+                      <a:latin typeface="Calibri Light" charset="0"/>
+                      <a:ea typeface="Calibri Light" charset="0"/>
+                      <a:cs typeface="Calibri Light" charset="0"/>
+                    </a:rPr>
+                  </a:br>
+                  <a:endParaRPr lang="en-US" sz="800" dirty="0">
                     <a:solidFill>
                       <a:schemeClr val="tx1"/>
                     </a:solidFill>
                     <a:latin typeface="Calibri Light" charset="0"/>
                     <a:ea typeface="Calibri Light" charset="0"/>
                     <a:cs typeface="Calibri Light" charset="0"/>
-                  </a:rPr>
-                  <a:t>Efficiency</a:t>
-                </a:r>
-              </a:p>
+                  </a:endParaRPr>
+                </a:p>
+              </p:txBody>
+            </p:sp>
+            <p:sp>
+              <p:nvSpPr>
+                <p:cNvPr id="57" name="Round Same Side Corner Rectangle 56"/>
+                <p:cNvSpPr/>
+                <p:nvPr/>
+              </p:nvSpPr>
+              <p:spPr>
+                <a:xfrm>
+                  <a:off x="1447800" y="762000"/>
+                  <a:ext cx="1828800" cy="266700"/>
+                </a:xfrm>
+                <a:prstGeom prst="round2SameRect">
+                  <a:avLst/>
+                </a:prstGeom>
+                <a:solidFill>
+                  <a:srgbClr val="CCFFCC"/>
+                </a:solidFill>
+                <a:ln w="12700" cmpd="sng" algn="ctr">
+                  <a:solidFill>
+                    <a:schemeClr val="tx1"/>
+                  </a:solidFill>
+                  <a:round/>
+                  <a:headEnd type="none" w="med" len="med"/>
+                  <a:tailEnd w="med" len="med"/>
+                </a:ln>
+                <a:effectLst/>
+              </p:spPr>
+              <p:style>
+                <a:lnRef idx="1">
+                  <a:schemeClr val="accent1"/>
+                </a:lnRef>
+                <a:fillRef idx="3">
+                  <a:schemeClr val="accent1"/>
+                </a:fillRef>
+                <a:effectRef idx="2">
+                  <a:schemeClr val="accent1"/>
+                </a:effectRef>
+                <a:fontRef idx="minor">
+                  <a:schemeClr val="lt1"/>
+                </a:fontRef>
+              </p:style>
+              <p:txBody>
+                <a:bodyPr rtlCol="0" anchor="ctr"/>
+                <a:lstStyle/>
+                <a:p>
+                  <a:pPr algn="ctr"/>
+                  <a:r>
+                    <a:rPr lang="en-US" sz="1100" b="1" dirty="0">
+                      <a:solidFill>
+                        <a:schemeClr val="tx1"/>
+                      </a:solidFill>
+                      <a:latin typeface="Calibri Light" charset="0"/>
+                      <a:ea typeface="Calibri Light" charset="0"/>
+                      <a:cs typeface="Calibri Light" charset="0"/>
+                    </a:rPr>
+                    <a:t>A. Fundamentals</a:t>
+                  </a:r>
+                </a:p>
+              </p:txBody>
+            </p:sp>
+          </p:grpSp>
+          <p:sp>
+            <p:nvSpPr>
+              <p:cNvPr id="125" name="TextBox 124"/>
+              <p:cNvSpPr txBox="1"/>
+              <p:nvPr/>
+            </p:nvSpPr>
+            <p:spPr>
+              <a:xfrm>
+                <a:off x="507060" y="3092362"/>
+                <a:ext cx="447209" cy="261610"/>
+              </a:xfrm>
+              <a:prstGeom prst="rect">
+                <a:avLst/>
+              </a:prstGeom>
+              <a:noFill/>
+            </p:spPr>
+            <p:txBody>
+              <a:bodyPr wrap="square" rtlCol="0">
+                <a:spAutoFit/>
+              </a:bodyPr>
+              <a:lstStyle/>
               <a:p>
-                <a:pPr algn="ctr"/>
                 <a:r>
-                  <a:rPr lang="en-US" sz="1000" dirty="0">
-                    <a:solidFill>
-                      <a:schemeClr val="tx1"/>
-                    </a:solidFill>
+                  <a:rPr lang="en-US" sz="1050" dirty="0">
                     <a:latin typeface="Calibri Light" charset="0"/>
                     <a:ea typeface="Calibri Light" charset="0"/>
                     <a:cs typeface="Calibri Light" charset="0"/>
                   </a:rPr>
-                  <a:t>Power</a:t>
-                </a:r>
-              </a:p>
-              <a:p>
-                <a:pPr algn="ctr"/>
-                <a:r>
-                  <a:rPr lang="en-US" sz="1000" dirty="0">
-                    <a:solidFill>
-                      <a:schemeClr val="tx1"/>
-                    </a:solidFill>
-                    <a:latin typeface="Calibri Light" charset="0"/>
-                    <a:ea typeface="Calibri Light" charset="0"/>
-                    <a:cs typeface="Calibri Light" charset="0"/>
-                  </a:rPr>
-                  <a:t>Scalability</a:t>
-                </a:r>
-              </a:p>
-              <a:p>
-                <a:pPr algn="ctr"/>
-                <a:r>
-                  <a:rPr lang="en-US" sz="1000" dirty="0">
-                    <a:solidFill>
-                      <a:schemeClr val="tx1"/>
-                    </a:solidFill>
-                    <a:latin typeface="Calibri Light" charset="0"/>
-                    <a:ea typeface="Calibri Light" charset="0"/>
-                    <a:cs typeface="Calibri Light" charset="0"/>
-                  </a:rPr>
-                  <a:t>Load Balancing</a:t>
-                </a:r>
-              </a:p>
-              <a:p>
-                <a:pPr algn="ctr"/>
-                <a:r>
-                  <a:rPr lang="en-US" sz="1000" dirty="0">
-                    <a:solidFill>
-                      <a:schemeClr val="tx1"/>
-                    </a:solidFill>
-                    <a:latin typeface="Calibri Light" charset="0"/>
-                    <a:ea typeface="Calibri Light" charset="0"/>
-                    <a:cs typeface="Calibri Light" charset="0"/>
-                  </a:rPr>
-                  <a:t>Data Locality</a:t>
-                </a:r>
-              </a:p>
-              <a:p>
-                <a:pPr algn="ctr"/>
-                <a:r>
-                  <a:rPr lang="en-US" sz="1000" dirty="0">
-                    <a:solidFill>
-                      <a:schemeClr val="tx1"/>
-                    </a:solidFill>
-                    <a:latin typeface="Calibri Light" charset="0"/>
-                    <a:ea typeface="Calibri Light" charset="0"/>
-                    <a:cs typeface="Calibri Light" charset="0"/>
-                  </a:rPr>
-                  <a:t>Data Movement</a:t>
+                  <a:t>low</a:t>
                 </a:r>
               </a:p>
             </p:txBody>
           </p:sp>
           <p:sp>
             <p:nvSpPr>
-              <p:cNvPr id="28" name="Round Same Side Corner Rectangle 27"/>
-              <p:cNvSpPr/>
+              <p:cNvPr id="126" name="TextBox 125"/>
+              <p:cNvSpPr txBox="1"/>
               <p:nvPr/>
             </p:nvSpPr>
             <p:spPr>
               <a:xfrm>
-                <a:off x="6436999" y="196976"/>
-                <a:ext cx="1226861" cy="482639"/>
+                <a:off x="472966" y="1067644"/>
+                <a:ext cx="506858" cy="261610"/>
               </a:xfrm>
-              <a:prstGeom prst="round2SameRect">
+              <a:prstGeom prst="rect">
                 <a:avLst/>
               </a:prstGeom>
-              <a:solidFill>
-                <a:srgbClr val="CCFFCC"/>
-              </a:solidFill>
-              <a:ln w="12700" cmpd="sng" algn="ctr">
-                <a:solidFill>
-                  <a:schemeClr val="tx1"/>
-                </a:solidFill>
-                <a:round/>
-                <a:headEnd type="none" w="med" len="med"/>
-                <a:tailEnd w="med" len="med"/>
-              </a:ln>
-              <a:effectLst/>
+              <a:noFill/>
             </p:spPr>
-            <p:style>
-              <a:lnRef idx="1">
-                <a:schemeClr val="accent1"/>
-              </a:lnRef>
-              <a:fillRef idx="3">
-                <a:schemeClr val="accent1"/>
-              </a:fillRef>
-              <a:effectRef idx="2">
-                <a:schemeClr val="accent1"/>
-              </a:effectRef>
-              <a:fontRef idx="minor">
-                <a:schemeClr val="lt1"/>
-              </a:fontRef>
-            </p:style>
             <p:txBody>
-              <a:bodyPr rtlCol="0" anchor="ctr"/>
+              <a:bodyPr wrap="square" rtlCol="0">
+                <a:spAutoFit/>
+              </a:bodyPr>
+              <a:lstStyle/>
+              <a:p>
+                <a:r>
+                  <a:rPr lang="en-US" sz="1050" dirty="0">
+                    <a:latin typeface="Calibri Light" charset="0"/>
+                    <a:ea typeface="Calibri Light" charset="0"/>
+                    <a:cs typeface="Calibri Light" charset="0"/>
+                  </a:rPr>
+                  <a:t>high</a:t>
+                </a:r>
+              </a:p>
+            </p:txBody>
+          </p:sp>
+          <p:sp>
+            <p:nvSpPr>
+              <p:cNvPr id="128" name="TextBox 127"/>
+              <p:cNvSpPr txBox="1"/>
+              <p:nvPr/>
+            </p:nvSpPr>
+            <p:spPr>
+              <a:xfrm rot="5400000">
+                <a:off x="103519" y="2135761"/>
+                <a:ext cx="1262062" cy="253004"/>
+              </a:xfrm>
+              <a:prstGeom prst="rect">
+                <a:avLst/>
+              </a:prstGeom>
+              <a:noFill/>
+            </p:spPr>
+            <p:txBody>
+              <a:bodyPr wrap="square" rtlCol="0">
+                <a:spAutoFit/>
+              </a:bodyPr>
               <a:lstStyle/>
               <a:p>
                 <a:pPr algn="ctr"/>
                 <a:r>
-                  <a:rPr lang="en-US" sz="1100" b="1" dirty="0">
-                    <a:solidFill>
-                      <a:schemeClr val="tx1"/>
-                    </a:solidFill>
+                  <a:rPr lang="en-US" sz="1050" dirty="0">
                     <a:latin typeface="Calibri Light" charset="0"/>
                     <a:ea typeface="Calibri Light" charset="0"/>
                     <a:cs typeface="Calibri Light" charset="0"/>
                   </a:rPr>
-                  <a:t>E. Performance</a:t>
+                  <a:t>Level of Abstraction</a:t>
                 </a:r>
               </a:p>
             </p:txBody>
           </p:sp>
         </p:grpSp>
-        <p:cxnSp>
-          <p:nvCxnSpPr>
-            <p:cNvPr id="31" name="Straight Arrow Connector 30"/>
-            <p:cNvCxnSpPr/>
-            <p:nvPr/>
-          </p:nvCxnSpPr>
-          <p:spPr>
-            <a:xfrm flipV="1">
-              <a:off x="969009" y="304800"/>
-              <a:ext cx="21593" cy="2644066"/>
-            </a:xfrm>
-            <a:prstGeom prst="straightConnector1">
-              <a:avLst/>
-            </a:prstGeom>
-            <a:ln w="12700" cmpd="sng" algn="ctr">
-              <a:solidFill>
-                <a:srgbClr val="000000"/>
-              </a:solidFill>
-              <a:round/>
-              <a:headEnd type="none" w="med" len="med"/>
-              <a:tailEnd type="arrow" w="med" len="med"/>
-            </a:ln>
-            <a:effectLst/>
-          </p:spPr>
-          <p:style>
-            <a:lnRef idx="2">
-              <a:schemeClr val="accent1"/>
-            </a:lnRef>
-            <a:fillRef idx="0">
-              <a:schemeClr val="accent1"/>
-            </a:fillRef>
-            <a:effectRef idx="1">
-              <a:schemeClr val="accent1"/>
-            </a:effectRef>
-            <a:fontRef idx="minor">
-              <a:schemeClr val="tx1"/>
-            </a:fontRef>
-          </p:style>
-        </p:cxnSp>
-        <p:grpSp>
-          <p:nvGrpSpPr>
-            <p:cNvPr id="55" name="Group 11"/>
-            <p:cNvGrpSpPr/>
-            <p:nvPr/>
-          </p:nvGrpSpPr>
-          <p:grpSpPr>
-            <a:xfrm>
-              <a:off x="1295400" y="265723"/>
-              <a:ext cx="5638800" cy="647193"/>
-              <a:chOff x="1447800" y="762000"/>
-              <a:chExt cx="1828800" cy="800309"/>
-            </a:xfrm>
-            <a:effectLst/>
-          </p:grpSpPr>
-          <p:sp>
-            <p:nvSpPr>
-              <p:cNvPr id="56" name="Rounded Rectangle 55"/>
-              <p:cNvSpPr/>
-              <p:nvPr/>
-            </p:nvSpPr>
-            <p:spPr>
-              <a:xfrm>
-                <a:off x="1447800" y="762001"/>
-                <a:ext cx="1828800" cy="800308"/>
-              </a:xfrm>
-              <a:prstGeom prst="roundRect">
-                <a:avLst/>
-              </a:prstGeom>
-              <a:noFill/>
-              <a:ln w="12700" cap="sq" cmpd="sng" algn="ctr">
-                <a:solidFill>
-                  <a:schemeClr val="tx1"/>
-                </a:solidFill>
-                <a:round/>
-                <a:headEnd type="none" w="med" len="med"/>
-                <a:tailEnd w="med" len="med"/>
-              </a:ln>
-              <a:effectLst/>
-            </p:spPr>
-            <p:style>
-              <a:lnRef idx="1">
-                <a:schemeClr val="accent1"/>
-              </a:lnRef>
-              <a:fillRef idx="3">
-                <a:schemeClr val="accent1"/>
-              </a:fillRef>
-              <a:effectRef idx="2">
-                <a:schemeClr val="accent1"/>
-              </a:effectRef>
-              <a:fontRef idx="minor">
-                <a:schemeClr val="lt1"/>
-              </a:fontRef>
-            </p:style>
-            <p:txBody>
-              <a:bodyPr rtlCol="0" anchor="ctr"/>
-              <a:lstStyle/>
-              <a:p>
-                <a:pPr algn="ctr"/>
-                <a:endParaRPr lang="en-US" sz="800" dirty="0">
-                  <a:solidFill>
-                    <a:schemeClr val="tx1"/>
-                  </a:solidFill>
-                  <a:latin typeface="Calibri Light" charset="0"/>
-                  <a:ea typeface="Calibri Light" charset="0"/>
-                  <a:cs typeface="Calibri Light" charset="0"/>
-                </a:endParaRPr>
-              </a:p>
-              <a:p>
-                <a:pPr algn="ctr"/>
-                <a:endParaRPr lang="en-US" sz="800" dirty="0">
-                  <a:solidFill>
-                    <a:schemeClr val="tx1"/>
-                  </a:solidFill>
-                  <a:latin typeface="Calibri Light" charset="0"/>
-                  <a:ea typeface="Calibri Light" charset="0"/>
-                  <a:cs typeface="Calibri Light" charset="0"/>
-                </a:endParaRPr>
-              </a:p>
-              <a:p>
-                <a:pPr algn="ctr"/>
-                <a:endParaRPr lang="en-US" sz="800" dirty="0">
-                  <a:solidFill>
-                    <a:schemeClr val="tx1"/>
-                  </a:solidFill>
-                  <a:latin typeface="Calibri Light" charset="0"/>
-                  <a:ea typeface="Calibri Light" charset="0"/>
-                  <a:cs typeface="Calibri Light" charset="0"/>
-                </a:endParaRPr>
-              </a:p>
-              <a:p>
-                <a:pPr algn="ctr"/>
-                <a:br>
-                  <a:rPr lang="en-US" sz="1000" dirty="0">
-                    <a:solidFill>
-                      <a:schemeClr val="tx1"/>
-                    </a:solidFill>
-                    <a:latin typeface="Calibri Light" charset="0"/>
-                    <a:ea typeface="Calibri Light" charset="0"/>
-                    <a:cs typeface="Calibri Light" charset="0"/>
-                  </a:rPr>
-                </a:br>
-                <a:r>
-                  <a:rPr lang="en-US" sz="1000" dirty="0">
-                    <a:solidFill>
-                      <a:schemeClr val="tx1"/>
-                    </a:solidFill>
-                    <a:latin typeface="Calibri Light" charset="0"/>
-                    <a:ea typeface="Calibri Light" charset="0"/>
-                    <a:cs typeface="Calibri Light" charset="0"/>
-                  </a:rPr>
-                  <a:t>Concurrency and Parallelism,  Energy efficiency</a:t>
-                </a:r>
-              </a:p>
-              <a:p>
-                <a:pPr algn="ctr"/>
-                <a:r>
-                  <a:rPr lang="en-US" sz="1000" dirty="0">
-                    <a:solidFill>
-                      <a:schemeClr val="tx1"/>
-                    </a:solidFill>
-                    <a:latin typeface="Calibri Light" charset="0"/>
-                    <a:ea typeface="Calibri Light" charset="0"/>
-                    <a:cs typeface="Calibri Light" charset="0"/>
-                  </a:rPr>
-                  <a:t>Forms of Heterogeneity, Amdahl’s Law and HC</a:t>
-                </a:r>
-              </a:p>
-              <a:p>
-                <a:pPr algn="ctr"/>
-                <a:br>
-                  <a:rPr lang="en-US" sz="800" dirty="0">
-                    <a:solidFill>
-                      <a:schemeClr val="tx1"/>
-                    </a:solidFill>
-                    <a:latin typeface="Calibri Light" charset="0"/>
-                    <a:ea typeface="Calibri Light" charset="0"/>
-                    <a:cs typeface="Calibri Light" charset="0"/>
-                  </a:rPr>
-                </a:br>
-                <a:br>
-                  <a:rPr lang="en-US" sz="800" dirty="0">
-                    <a:solidFill>
-                      <a:schemeClr val="tx1"/>
-                    </a:solidFill>
-                    <a:latin typeface="Calibri Light" charset="0"/>
-                    <a:ea typeface="Calibri Light" charset="0"/>
-                    <a:cs typeface="Calibri Light" charset="0"/>
-                  </a:rPr>
-                </a:br>
-                <a:endParaRPr lang="en-US" sz="800" dirty="0">
-                  <a:solidFill>
-                    <a:schemeClr val="tx1"/>
-                  </a:solidFill>
-                  <a:latin typeface="Calibri Light" charset="0"/>
-                  <a:ea typeface="Calibri Light" charset="0"/>
-                  <a:cs typeface="Calibri Light" charset="0"/>
-                </a:endParaRPr>
-              </a:p>
-            </p:txBody>
-          </p:sp>
-          <p:sp>
-            <p:nvSpPr>
-              <p:cNvPr id="57" name="Round Same Side Corner Rectangle 56"/>
-              <p:cNvSpPr/>
-              <p:nvPr/>
-            </p:nvSpPr>
-            <p:spPr>
-              <a:xfrm>
-                <a:off x="1447800" y="762000"/>
-                <a:ext cx="1828800" cy="266700"/>
-              </a:xfrm>
-              <a:prstGeom prst="round2SameRect">
-                <a:avLst/>
-              </a:prstGeom>
-              <a:solidFill>
-                <a:srgbClr val="CCFFCC"/>
-              </a:solidFill>
-              <a:ln w="12700" cmpd="sng" algn="ctr">
-                <a:solidFill>
-                  <a:schemeClr val="tx1"/>
-                </a:solidFill>
-                <a:round/>
-                <a:headEnd type="none" w="med" len="med"/>
-                <a:tailEnd w="med" len="med"/>
-              </a:ln>
-              <a:effectLst/>
-            </p:spPr>
-            <p:style>
-              <a:lnRef idx="1">
-                <a:schemeClr val="accent1"/>
-              </a:lnRef>
-              <a:fillRef idx="3">
-                <a:schemeClr val="accent1"/>
-              </a:fillRef>
-              <a:effectRef idx="2">
-                <a:schemeClr val="accent1"/>
-              </a:effectRef>
-              <a:fontRef idx="minor">
-                <a:schemeClr val="lt1"/>
-              </a:fontRef>
-            </p:style>
-            <p:txBody>
-              <a:bodyPr rtlCol="0" anchor="ctr"/>
-              <a:lstStyle/>
-              <a:p>
-                <a:pPr algn="ctr"/>
-                <a:r>
-                  <a:rPr lang="en-US" sz="1100" b="1" dirty="0">
-                    <a:solidFill>
-                      <a:schemeClr val="tx1"/>
-                    </a:solidFill>
-                    <a:latin typeface="Calibri Light" charset="0"/>
-                    <a:ea typeface="Calibri Light" charset="0"/>
-                    <a:cs typeface="Calibri Light" charset="0"/>
-                  </a:rPr>
-                  <a:t>A. Fundamentals</a:t>
-                </a:r>
-              </a:p>
-            </p:txBody>
-          </p:sp>
-        </p:grpSp>
-        <p:sp>
-          <p:nvSpPr>
-            <p:cNvPr id="125" name="TextBox 124"/>
-            <p:cNvSpPr txBox="1"/>
-            <p:nvPr/>
-          </p:nvSpPr>
-          <p:spPr>
-            <a:xfrm>
-              <a:off x="549452" y="2590802"/>
-              <a:ext cx="419556" cy="300419"/>
-            </a:xfrm>
-            <a:prstGeom prst="rect">
-              <a:avLst/>
-            </a:prstGeom>
-            <a:noFill/>
-          </p:spPr>
-          <p:txBody>
-            <a:bodyPr wrap="square" rtlCol="0">
-              <a:spAutoFit/>
-            </a:bodyPr>
-            <a:lstStyle/>
-            <a:p>
-              <a:r>
-                <a:rPr lang="en-US" sz="1050" dirty="0">
-                  <a:latin typeface="Calibri Light" charset="0"/>
-                  <a:ea typeface="Calibri Light" charset="0"/>
-                  <a:cs typeface="Calibri Light" charset="0"/>
-                </a:rPr>
-                <a:t>low</a:t>
-              </a:r>
-            </a:p>
-          </p:txBody>
-        </p:sp>
-        <p:sp>
-          <p:nvSpPr>
-            <p:cNvPr id="126" name="TextBox 125"/>
-            <p:cNvSpPr txBox="1"/>
-            <p:nvPr/>
-          </p:nvSpPr>
-          <p:spPr>
-            <a:xfrm>
-              <a:off x="517466" y="265723"/>
-              <a:ext cx="475516" cy="300419"/>
-            </a:xfrm>
-            <a:prstGeom prst="rect">
-              <a:avLst/>
-            </a:prstGeom>
-            <a:noFill/>
-          </p:spPr>
-          <p:txBody>
-            <a:bodyPr wrap="square" rtlCol="0">
-              <a:spAutoFit/>
-            </a:bodyPr>
-            <a:lstStyle/>
-            <a:p>
-              <a:r>
-                <a:rPr lang="en-US" sz="1050" dirty="0">
-                  <a:latin typeface="Calibri Light" charset="0"/>
-                  <a:ea typeface="Calibri Light" charset="0"/>
-                  <a:cs typeface="Calibri Light" charset="0"/>
-                </a:rPr>
-                <a:t>high</a:t>
-              </a:r>
-            </a:p>
-          </p:txBody>
-        </p:sp>
-        <p:sp>
-          <p:nvSpPr>
-            <p:cNvPr id="128" name="TextBox 127"/>
-            <p:cNvSpPr txBox="1"/>
-            <p:nvPr/>
-          </p:nvSpPr>
-          <p:spPr>
-            <a:xfrm rot="5400000">
-              <a:off x="38232" y="1518880"/>
-              <a:ext cx="1449285" cy="237359"/>
-            </a:xfrm>
-            <a:prstGeom prst="rect">
-              <a:avLst/>
-            </a:prstGeom>
-            <a:noFill/>
-          </p:spPr>
-          <p:txBody>
-            <a:bodyPr wrap="square" rtlCol="0">
-              <a:spAutoFit/>
-            </a:bodyPr>
-            <a:lstStyle/>
-            <a:p>
-              <a:pPr algn="ctr"/>
-              <a:r>
-                <a:rPr lang="en-US" sz="1050" dirty="0">
-                  <a:latin typeface="Calibri Light" charset="0"/>
-                  <a:ea typeface="Calibri Light" charset="0"/>
-                  <a:cs typeface="Calibri Light" charset="0"/>
-                </a:rPr>
-                <a:t>Level of Abstraction</a:t>
-              </a:r>
-            </a:p>
-          </p:txBody>
-        </p:sp>
       </p:grpSp>
     </p:spTree>
     <p:extLst>

</xml_diff>